<commit_message>
presentation now with images
</commit_message>
<xml_diff>
--- a/docs/MMS_Final_Presentation.pptx
+++ b/docs/MMS_Final_Presentation.pptx
@@ -6,18 +6,22 @@
     <p:sldMasterId id="2147483650" r:id="rId2"/>
   </p:sldMasterIdLst>
   <p:notesMasterIdLst>
-    <p:notesMasterId r:id="rId9"/>
+    <p:notesMasterId r:id="rId13"/>
   </p:notesMasterIdLst>
   <p:handoutMasterIdLst>
-    <p:handoutMasterId r:id="rId10"/>
+    <p:handoutMasterId r:id="rId14"/>
   </p:handoutMasterIdLst>
   <p:sldIdLst>
     <p:sldId id="256" r:id="rId3"/>
     <p:sldId id="267" r:id="rId4"/>
     <p:sldId id="268" r:id="rId5"/>
-    <p:sldId id="269" r:id="rId6"/>
-    <p:sldId id="270" r:id="rId7"/>
-    <p:sldId id="271" r:id="rId8"/>
+    <p:sldId id="272" r:id="rId6"/>
+    <p:sldId id="273" r:id="rId7"/>
+    <p:sldId id="269" r:id="rId8"/>
+    <p:sldId id="270" r:id="rId9"/>
+    <p:sldId id="271" r:id="rId10"/>
+    <p:sldId id="275" r:id="rId11"/>
+    <p:sldId id="274" r:id="rId12"/>
   </p:sldIdLst>
   <p:sldSz cx="9144000" cy="6858000" type="screen4x3"/>
   <p:notesSz cx="6794500" cy="9906000"/>
@@ -636,6 +640,93 @@
 </p:notes>
 </file>
 
+<file path=ppt/notesSlides/notesSlide10.xml><?xml version="1.0" encoding="utf-8"?>
+<p:notes xmlns:a="http://schemas.openxmlformats.org/drawingml/2006/main" xmlns:r="http://schemas.openxmlformats.org/officeDocument/2006/relationships" xmlns:p="http://schemas.openxmlformats.org/presentationml/2006/main">
+  <p:cSld>
+    <p:spTree>
+      <p:nvGrpSpPr>
+        <p:cNvPr id="1" name=""/>
+        <p:cNvGrpSpPr/>
+        <p:nvPr/>
+      </p:nvGrpSpPr>
+      <p:grpSpPr>
+        <a:xfrm>
+          <a:off x="0" y="0"/>
+          <a:ext cx="0" cy="0"/>
+          <a:chOff x="0" y="0"/>
+          <a:chExt cx="0" cy="0"/>
+        </a:xfrm>
+      </p:grpSpPr>
+      <p:sp>
+        <p:nvSpPr>
+          <p:cNvPr id="350210" name="Rectangle 2"/>
+          <p:cNvSpPr>
+            <a:spLocks noGrp="1" noRot="1" noChangeAspect="1" noChangeArrowheads="1" noTextEdit="1"/>
+          </p:cNvSpPr>
+          <p:nvPr>
+            <p:ph type="sldImg"/>
+          </p:nvPr>
+        </p:nvSpPr>
+        <p:spPr bwMode="auto">
+          <a:xfrm>
+            <a:off x="920750" y="742950"/>
+            <a:ext cx="4953000" cy="3714750"/>
+          </a:xfrm>
+          <a:prstGeom prst="rect">
+            <a:avLst/>
+          </a:prstGeom>
+          <a:noFill/>
+          <a:ln>
+            <a:solidFill>
+              <a:srgbClr val="000000"/>
+            </a:solidFill>
+            <a:miter lim="800000"/>
+            <a:headEnd/>
+            <a:tailEnd/>
+          </a:ln>
+        </p:spPr>
+      </p:sp>
+      <p:sp>
+        <p:nvSpPr>
+          <p:cNvPr id="350211" name="Rectangle 3"/>
+          <p:cNvSpPr>
+            <a:spLocks noGrp="1" noChangeArrowheads="1"/>
+          </p:cNvSpPr>
+          <p:nvPr>
+            <p:ph type="body" idx="1"/>
+          </p:nvPr>
+        </p:nvSpPr>
+        <p:spPr bwMode="auto">
+          <a:xfrm>
+            <a:off x="679450" y="4705350"/>
+            <a:ext cx="5435600" cy="4457700"/>
+          </a:xfrm>
+          <a:prstGeom prst="rect">
+            <a:avLst/>
+          </a:prstGeom>
+          <a:noFill/>
+          <a:ln>
+            <a:miter lim="800000"/>
+            <a:headEnd/>
+            <a:tailEnd/>
+          </a:ln>
+        </p:spPr>
+        <p:txBody>
+          <a:bodyPr/>
+          <a:lstStyle/>
+          <a:p>
+            <a:endParaRPr lang="fi-FI"/>
+          </a:p>
+        </p:txBody>
+      </p:sp>
+    </p:spTree>
+  </p:cSld>
+  <p:clrMapOvr>
+    <a:masterClrMapping/>
+  </p:clrMapOvr>
+</p:notes>
+</file>
+
 <file path=ppt/notesSlides/notesSlide2.xml><?xml version="1.0" encoding="utf-8"?>
 <p:notes xmlns:a="http://schemas.openxmlformats.org/drawingml/2006/main" xmlns:r="http://schemas.openxmlformats.org/officeDocument/2006/relationships" xmlns:p="http://schemas.openxmlformats.org/presentationml/2006/main">
   <p:cSld>
@@ -829,7 +920,7 @@
       </p:grpSpPr>
       <p:sp>
         <p:nvSpPr>
-          <p:cNvPr id="346114" name="Rectangle 2"/>
+          <p:cNvPr id="344066" name="Rectangle 2"/>
           <p:cNvSpPr>
             <a:spLocks noGrp="1" noRot="1" noChangeAspect="1" noChangeArrowheads="1" noTextEdit="1"/>
           </p:cNvSpPr>
@@ -858,7 +949,7 @@
       </p:sp>
       <p:sp>
         <p:nvSpPr>
-          <p:cNvPr id="346115" name="Rectangle 3"/>
+          <p:cNvPr id="344067" name="Rectangle 3"/>
           <p:cNvSpPr>
             <a:spLocks noGrp="1" noChangeArrowheads="1"/>
           </p:cNvSpPr>
@@ -916,7 +1007,7 @@
       </p:grpSpPr>
       <p:sp>
         <p:nvSpPr>
-          <p:cNvPr id="348162" name="Rectangle 2"/>
+          <p:cNvPr id="344066" name="Rectangle 2"/>
           <p:cNvSpPr>
             <a:spLocks noGrp="1" noRot="1" noChangeAspect="1" noChangeArrowheads="1" noTextEdit="1"/>
           </p:cNvSpPr>
@@ -945,7 +1036,7 @@
       </p:sp>
       <p:sp>
         <p:nvSpPr>
-          <p:cNvPr id="348163" name="Rectangle 3"/>
+          <p:cNvPr id="344067" name="Rectangle 3"/>
           <p:cNvSpPr>
             <a:spLocks noGrp="1" noChangeArrowheads="1"/>
           </p:cNvSpPr>
@@ -985,6 +1076,267 @@
 </file>
 
 <file path=ppt/notesSlides/notesSlide6.xml><?xml version="1.0" encoding="utf-8"?>
+<p:notes xmlns:a="http://schemas.openxmlformats.org/drawingml/2006/main" xmlns:r="http://schemas.openxmlformats.org/officeDocument/2006/relationships" xmlns:p="http://schemas.openxmlformats.org/presentationml/2006/main">
+  <p:cSld>
+    <p:spTree>
+      <p:nvGrpSpPr>
+        <p:cNvPr id="1" name=""/>
+        <p:cNvGrpSpPr/>
+        <p:nvPr/>
+      </p:nvGrpSpPr>
+      <p:grpSpPr>
+        <a:xfrm>
+          <a:off x="0" y="0"/>
+          <a:ext cx="0" cy="0"/>
+          <a:chOff x="0" y="0"/>
+          <a:chExt cx="0" cy="0"/>
+        </a:xfrm>
+      </p:grpSpPr>
+      <p:sp>
+        <p:nvSpPr>
+          <p:cNvPr id="346114" name="Rectangle 2"/>
+          <p:cNvSpPr>
+            <a:spLocks noGrp="1" noRot="1" noChangeAspect="1" noChangeArrowheads="1" noTextEdit="1"/>
+          </p:cNvSpPr>
+          <p:nvPr>
+            <p:ph type="sldImg"/>
+          </p:nvPr>
+        </p:nvSpPr>
+        <p:spPr bwMode="auto">
+          <a:xfrm>
+            <a:off x="920750" y="742950"/>
+            <a:ext cx="4953000" cy="3714750"/>
+          </a:xfrm>
+          <a:prstGeom prst="rect">
+            <a:avLst/>
+          </a:prstGeom>
+          <a:noFill/>
+          <a:ln>
+            <a:solidFill>
+              <a:srgbClr val="000000"/>
+            </a:solidFill>
+            <a:miter lim="800000"/>
+            <a:headEnd/>
+            <a:tailEnd/>
+          </a:ln>
+        </p:spPr>
+      </p:sp>
+      <p:sp>
+        <p:nvSpPr>
+          <p:cNvPr id="346115" name="Rectangle 3"/>
+          <p:cNvSpPr>
+            <a:spLocks noGrp="1" noChangeArrowheads="1"/>
+          </p:cNvSpPr>
+          <p:nvPr>
+            <p:ph type="body" idx="1"/>
+          </p:nvPr>
+        </p:nvSpPr>
+        <p:spPr bwMode="auto">
+          <a:xfrm>
+            <a:off x="679450" y="4705350"/>
+            <a:ext cx="5435600" cy="4457700"/>
+          </a:xfrm>
+          <a:prstGeom prst="rect">
+            <a:avLst/>
+          </a:prstGeom>
+          <a:noFill/>
+          <a:ln>
+            <a:miter lim="800000"/>
+            <a:headEnd/>
+            <a:tailEnd/>
+          </a:ln>
+        </p:spPr>
+        <p:txBody>
+          <a:bodyPr/>
+          <a:lstStyle/>
+          <a:p>
+            <a:endParaRPr lang="fi-FI"/>
+          </a:p>
+        </p:txBody>
+      </p:sp>
+    </p:spTree>
+  </p:cSld>
+  <p:clrMapOvr>
+    <a:masterClrMapping/>
+  </p:clrMapOvr>
+</p:notes>
+</file>
+
+<file path=ppt/notesSlides/notesSlide7.xml><?xml version="1.0" encoding="utf-8"?>
+<p:notes xmlns:a="http://schemas.openxmlformats.org/drawingml/2006/main" xmlns:r="http://schemas.openxmlformats.org/officeDocument/2006/relationships" xmlns:p="http://schemas.openxmlformats.org/presentationml/2006/main">
+  <p:cSld>
+    <p:spTree>
+      <p:nvGrpSpPr>
+        <p:cNvPr id="1" name=""/>
+        <p:cNvGrpSpPr/>
+        <p:nvPr/>
+      </p:nvGrpSpPr>
+      <p:grpSpPr>
+        <a:xfrm>
+          <a:off x="0" y="0"/>
+          <a:ext cx="0" cy="0"/>
+          <a:chOff x="0" y="0"/>
+          <a:chExt cx="0" cy="0"/>
+        </a:xfrm>
+      </p:grpSpPr>
+      <p:sp>
+        <p:nvSpPr>
+          <p:cNvPr id="348162" name="Rectangle 2"/>
+          <p:cNvSpPr>
+            <a:spLocks noGrp="1" noRot="1" noChangeAspect="1" noChangeArrowheads="1" noTextEdit="1"/>
+          </p:cNvSpPr>
+          <p:nvPr>
+            <p:ph type="sldImg"/>
+          </p:nvPr>
+        </p:nvSpPr>
+        <p:spPr bwMode="auto">
+          <a:xfrm>
+            <a:off x="920750" y="742950"/>
+            <a:ext cx="4953000" cy="3714750"/>
+          </a:xfrm>
+          <a:prstGeom prst="rect">
+            <a:avLst/>
+          </a:prstGeom>
+          <a:noFill/>
+          <a:ln>
+            <a:solidFill>
+              <a:srgbClr val="000000"/>
+            </a:solidFill>
+            <a:miter lim="800000"/>
+            <a:headEnd/>
+            <a:tailEnd/>
+          </a:ln>
+        </p:spPr>
+      </p:sp>
+      <p:sp>
+        <p:nvSpPr>
+          <p:cNvPr id="348163" name="Rectangle 3"/>
+          <p:cNvSpPr>
+            <a:spLocks noGrp="1" noChangeArrowheads="1"/>
+          </p:cNvSpPr>
+          <p:nvPr>
+            <p:ph type="body" idx="1"/>
+          </p:nvPr>
+        </p:nvSpPr>
+        <p:spPr bwMode="auto">
+          <a:xfrm>
+            <a:off x="679450" y="4705350"/>
+            <a:ext cx="5435600" cy="4457700"/>
+          </a:xfrm>
+          <a:prstGeom prst="rect">
+            <a:avLst/>
+          </a:prstGeom>
+          <a:noFill/>
+          <a:ln>
+            <a:miter lim="800000"/>
+            <a:headEnd/>
+            <a:tailEnd/>
+          </a:ln>
+        </p:spPr>
+        <p:txBody>
+          <a:bodyPr/>
+          <a:lstStyle/>
+          <a:p>
+            <a:endParaRPr lang="fi-FI"/>
+          </a:p>
+        </p:txBody>
+      </p:sp>
+    </p:spTree>
+  </p:cSld>
+  <p:clrMapOvr>
+    <a:masterClrMapping/>
+  </p:clrMapOvr>
+</p:notes>
+</file>
+
+<file path=ppt/notesSlides/notesSlide8.xml><?xml version="1.0" encoding="utf-8"?>
+<p:notes xmlns:a="http://schemas.openxmlformats.org/drawingml/2006/main" xmlns:r="http://schemas.openxmlformats.org/officeDocument/2006/relationships" xmlns:p="http://schemas.openxmlformats.org/presentationml/2006/main">
+  <p:cSld>
+    <p:spTree>
+      <p:nvGrpSpPr>
+        <p:cNvPr id="1" name=""/>
+        <p:cNvGrpSpPr/>
+        <p:nvPr/>
+      </p:nvGrpSpPr>
+      <p:grpSpPr>
+        <a:xfrm>
+          <a:off x="0" y="0"/>
+          <a:ext cx="0" cy="0"/>
+          <a:chOff x="0" y="0"/>
+          <a:chExt cx="0" cy="0"/>
+        </a:xfrm>
+      </p:grpSpPr>
+      <p:sp>
+        <p:nvSpPr>
+          <p:cNvPr id="350210" name="Rectangle 2"/>
+          <p:cNvSpPr>
+            <a:spLocks noGrp="1" noRot="1" noChangeAspect="1" noChangeArrowheads="1" noTextEdit="1"/>
+          </p:cNvSpPr>
+          <p:nvPr>
+            <p:ph type="sldImg"/>
+          </p:nvPr>
+        </p:nvSpPr>
+        <p:spPr bwMode="auto">
+          <a:xfrm>
+            <a:off x="920750" y="742950"/>
+            <a:ext cx="4953000" cy="3714750"/>
+          </a:xfrm>
+          <a:prstGeom prst="rect">
+            <a:avLst/>
+          </a:prstGeom>
+          <a:noFill/>
+          <a:ln>
+            <a:solidFill>
+              <a:srgbClr val="000000"/>
+            </a:solidFill>
+            <a:miter lim="800000"/>
+            <a:headEnd/>
+            <a:tailEnd/>
+          </a:ln>
+        </p:spPr>
+      </p:sp>
+      <p:sp>
+        <p:nvSpPr>
+          <p:cNvPr id="350211" name="Rectangle 3"/>
+          <p:cNvSpPr>
+            <a:spLocks noGrp="1" noChangeArrowheads="1"/>
+          </p:cNvSpPr>
+          <p:nvPr>
+            <p:ph type="body" idx="1"/>
+          </p:nvPr>
+        </p:nvSpPr>
+        <p:spPr bwMode="auto">
+          <a:xfrm>
+            <a:off x="679450" y="4705350"/>
+            <a:ext cx="5435600" cy="4457700"/>
+          </a:xfrm>
+          <a:prstGeom prst="rect">
+            <a:avLst/>
+          </a:prstGeom>
+          <a:noFill/>
+          <a:ln>
+            <a:miter lim="800000"/>
+            <a:headEnd/>
+            <a:tailEnd/>
+          </a:ln>
+        </p:spPr>
+        <p:txBody>
+          <a:bodyPr/>
+          <a:lstStyle/>
+          <a:p>
+            <a:endParaRPr lang="fi-FI"/>
+          </a:p>
+        </p:txBody>
+      </p:sp>
+    </p:spTree>
+  </p:cSld>
+  <p:clrMapOvr>
+    <a:masterClrMapping/>
+  </p:clrMapOvr>
+</p:notes>
+</file>
+
+<file path=ppt/notesSlides/notesSlide9.xml><?xml version="1.0" encoding="utf-8"?>
 <p:notes xmlns:a="http://schemas.openxmlformats.org/drawingml/2006/main" xmlns:r="http://schemas.openxmlformats.org/officeDocument/2006/relationships" xmlns:p="http://schemas.openxmlformats.org/presentationml/2006/main">
   <p:cSld>
     <p:spTree>
@@ -6113,7 +6465,7 @@
         </p:nvSpPr>
         <p:spPr bwMode="auto">
           <a:xfrm>
-            <a:off x="1492250" y="3478213"/>
+            <a:off x="996950" y="3478213"/>
             <a:ext cx="6665913" cy="1569660"/>
           </a:xfrm>
           <a:prstGeom prst="rect">
@@ -6264,6 +6616,274 @@
               <a:t>, Antti Väyrynen</a:t>
             </a:r>
             <a:endParaRPr lang="fi-FI" sz="1600" dirty="0"/>
+          </a:p>
+        </p:txBody>
+      </p:sp>
+    </p:spTree>
+  </p:cSld>
+  <p:clrMapOvr>
+    <a:masterClrMapping/>
+  </p:clrMapOvr>
+  <p:timing>
+    <p:tnLst>
+      <p:par>
+        <p:cTn id="1" dur="indefinite" restart="never" nodeType="tmRoot"/>
+      </p:par>
+    </p:tnLst>
+  </p:timing>
+</p:sld>
+</file>
+
+<file path=ppt/slides/slide10.xml><?xml version="1.0" encoding="utf-8"?>
+<p:sld xmlns:a="http://schemas.openxmlformats.org/drawingml/2006/main" xmlns:r="http://schemas.openxmlformats.org/officeDocument/2006/relationships" xmlns:p="http://schemas.openxmlformats.org/presentationml/2006/main">
+  <p:cSld>
+    <p:spTree>
+      <p:nvGrpSpPr>
+        <p:cNvPr id="1" name=""/>
+        <p:cNvGrpSpPr/>
+        <p:nvPr/>
+      </p:nvGrpSpPr>
+      <p:grpSpPr>
+        <a:xfrm>
+          <a:off x="0" y="0"/>
+          <a:ext cx="0" cy="0"/>
+          <a:chOff x="0" y="0"/>
+          <a:chExt cx="0" cy="0"/>
+        </a:xfrm>
+      </p:grpSpPr>
+      <p:sp>
+        <p:nvSpPr>
+          <p:cNvPr id="349186" name="Rectangle 2"/>
+          <p:cNvSpPr>
+            <a:spLocks noGrp="1" noChangeArrowheads="1"/>
+          </p:cNvSpPr>
+          <p:nvPr>
+            <p:ph type="title"/>
+          </p:nvPr>
+        </p:nvSpPr>
+        <p:spPr/>
+        <p:txBody>
+          <a:bodyPr/>
+          <a:lstStyle/>
+          <a:p>
+            <a:r>
+              <a:rPr lang="fi-FI"/>
+              <a:t>Experiences</a:t>
+            </a:r>
+          </a:p>
+        </p:txBody>
+      </p:sp>
+      <p:sp>
+        <p:nvSpPr>
+          <p:cNvPr id="349187" name="Rectangle 3"/>
+          <p:cNvSpPr>
+            <a:spLocks noGrp="1" noChangeArrowheads="1"/>
+          </p:cNvSpPr>
+          <p:nvPr>
+            <p:ph type="body" idx="1"/>
+          </p:nvPr>
+        </p:nvSpPr>
+        <p:spPr/>
+        <p:txBody>
+          <a:bodyPr/>
+          <a:lstStyle/>
+          <a:p>
+            <a:r>
+              <a:rPr lang="fi-FI" dirty="0" err="1" smtClean="0"/>
+              <a:t>Stream</a:t>
+            </a:r>
+            <a:r>
+              <a:rPr lang="fi-FI" dirty="0" smtClean="0"/>
+              <a:t> </a:t>
+            </a:r>
+            <a:r>
+              <a:rPr lang="fi-FI" dirty="0" err="1" smtClean="0"/>
+              <a:t>quality</a:t>
+            </a:r>
+            <a:r>
+              <a:rPr lang="fi-FI" dirty="0" smtClean="0"/>
+              <a:t> and </a:t>
+            </a:r>
+            <a:r>
+              <a:rPr lang="fi-FI" dirty="0" err="1" smtClean="0"/>
+              <a:t>optimizing</a:t>
+            </a:r>
+            <a:r>
+              <a:rPr lang="fi-FI" dirty="0" smtClean="0"/>
+              <a:t> </a:t>
+            </a:r>
+            <a:r>
+              <a:rPr lang="fi-FI" dirty="0" err="1" smtClean="0"/>
+              <a:t>latency</a:t>
+            </a:r>
+            <a:r>
+              <a:rPr lang="fi-FI" dirty="0" smtClean="0"/>
+              <a:t> </a:t>
+            </a:r>
+            <a:r>
+              <a:rPr lang="fi-FI" dirty="0" err="1" smtClean="0"/>
+              <a:t>were</a:t>
+            </a:r>
+            <a:r>
+              <a:rPr lang="fi-FI" dirty="0" smtClean="0"/>
+              <a:t> main </a:t>
+            </a:r>
+            <a:r>
+              <a:rPr lang="fi-FI" dirty="0" err="1" smtClean="0"/>
+              <a:t>issues</a:t>
+            </a:r>
+            <a:endParaRPr lang="fi-FI" dirty="0" smtClean="0"/>
+          </a:p>
+          <a:p>
+            <a:r>
+              <a:rPr lang="fi-FI" dirty="0" err="1" smtClean="0"/>
+              <a:t>Game</a:t>
+            </a:r>
+            <a:r>
+              <a:rPr lang="fi-FI" dirty="0" smtClean="0"/>
+              <a:t> </a:t>
+            </a:r>
+            <a:r>
+              <a:rPr lang="fi-FI" dirty="0" err="1" smtClean="0"/>
+              <a:t>running</a:t>
+            </a:r>
+            <a:r>
+              <a:rPr lang="fi-FI" dirty="0" smtClean="0"/>
+              <a:t> and video </a:t>
+            </a:r>
+            <a:r>
+              <a:rPr lang="fi-FI" dirty="0" err="1" smtClean="0"/>
+              <a:t>streaming</a:t>
+            </a:r>
+            <a:r>
+              <a:rPr lang="fi-FI" dirty="0" smtClean="0"/>
+              <a:t> </a:t>
+            </a:r>
+            <a:r>
+              <a:rPr lang="fi-FI" dirty="0" err="1" smtClean="0"/>
+              <a:t>are</a:t>
+            </a:r>
+            <a:r>
+              <a:rPr lang="fi-FI" dirty="0" smtClean="0"/>
+              <a:t> </a:t>
+            </a:r>
+            <a:r>
+              <a:rPr lang="fi-FI" dirty="0" err="1" smtClean="0"/>
+              <a:t>power</a:t>
+            </a:r>
+            <a:r>
+              <a:rPr lang="fi-FI" dirty="0" smtClean="0"/>
+              <a:t> </a:t>
+            </a:r>
+            <a:r>
+              <a:rPr lang="fi-FI" dirty="0" err="1" smtClean="0"/>
+              <a:t>consuming</a:t>
+            </a:r>
+            <a:r>
+              <a:rPr lang="fi-FI" dirty="0" smtClean="0"/>
+              <a:t>.</a:t>
+            </a:r>
+          </a:p>
+          <a:p>
+            <a:r>
+              <a:rPr lang="fi-FI" dirty="0" err="1" smtClean="0"/>
+              <a:t>High</a:t>
+            </a:r>
+            <a:r>
+              <a:rPr lang="fi-FI" dirty="0" smtClean="0"/>
+              <a:t> </a:t>
+            </a:r>
+            <a:r>
+              <a:rPr lang="fi-FI" dirty="0" err="1" smtClean="0"/>
+              <a:t>bandwidth</a:t>
+            </a:r>
+            <a:r>
+              <a:rPr lang="fi-FI" dirty="0" smtClean="0"/>
+              <a:t> is </a:t>
+            </a:r>
+            <a:r>
+              <a:rPr lang="fi-FI" dirty="0" err="1" smtClean="0"/>
+              <a:t>needed</a:t>
+            </a:r>
+            <a:r>
+              <a:rPr lang="fi-FI" dirty="0" smtClean="0"/>
+              <a:t> to </a:t>
+            </a:r>
+            <a:r>
+              <a:rPr lang="fi-FI" dirty="0" err="1" smtClean="0"/>
+              <a:t>achieve</a:t>
+            </a:r>
+            <a:r>
+              <a:rPr lang="fi-FI" dirty="0" smtClean="0"/>
+              <a:t> </a:t>
+            </a:r>
+            <a:r>
+              <a:rPr lang="fi-FI" dirty="0" err="1" smtClean="0"/>
+              <a:t>good</a:t>
+            </a:r>
+            <a:r>
+              <a:rPr lang="fi-FI" dirty="0" smtClean="0"/>
+              <a:t> </a:t>
+            </a:r>
+            <a:r>
+              <a:rPr lang="fi-FI" dirty="0" err="1" smtClean="0"/>
+              <a:t>stream</a:t>
+            </a:r>
+            <a:r>
+              <a:rPr lang="fi-FI" dirty="0" smtClean="0"/>
+              <a:t> </a:t>
+            </a:r>
+            <a:r>
+              <a:rPr lang="fi-FI" dirty="0" err="1" smtClean="0"/>
+              <a:t>quality</a:t>
+            </a:r>
+            <a:endParaRPr lang="fi-FI" dirty="0" smtClean="0"/>
+          </a:p>
+          <a:p>
+            <a:r>
+              <a:rPr lang="fi-FI" dirty="0" err="1" smtClean="0"/>
+              <a:t>Latency</a:t>
+            </a:r>
+            <a:r>
+              <a:rPr lang="fi-FI" dirty="0" smtClean="0"/>
+              <a:t> is the main </a:t>
+            </a:r>
+            <a:r>
+              <a:rPr lang="fi-FI" dirty="0" err="1" smtClean="0"/>
+              <a:t>issue</a:t>
+            </a:r>
+            <a:endParaRPr lang="fi-FI" dirty="0" smtClean="0"/>
+          </a:p>
+          <a:p>
+            <a:r>
+              <a:rPr lang="fi-FI" dirty="0" err="1" smtClean="0"/>
+              <a:t>Overall</a:t>
+            </a:r>
+            <a:r>
+              <a:rPr lang="fi-FI" dirty="0" smtClean="0"/>
+              <a:t> the </a:t>
+            </a:r>
+            <a:r>
+              <a:rPr lang="fi-FI" dirty="0" err="1" smtClean="0"/>
+              <a:t>project</a:t>
+            </a:r>
+            <a:r>
+              <a:rPr lang="fi-FI" dirty="0" smtClean="0"/>
+              <a:t> </a:t>
+            </a:r>
+            <a:r>
+              <a:rPr lang="fi-FI" dirty="0" err="1" smtClean="0"/>
+              <a:t>was</a:t>
+            </a:r>
+            <a:r>
+              <a:rPr lang="fi-FI" dirty="0" smtClean="0"/>
+              <a:t> </a:t>
+            </a:r>
+            <a:r>
+              <a:rPr lang="fi-FI" dirty="0" err="1" smtClean="0"/>
+              <a:t>challenging</a:t>
+            </a:r>
+            <a:endParaRPr lang="fi-FI" dirty="0"/>
           </a:p>
         </p:txBody>
       </p:sp>
@@ -6358,27 +6978,19 @@
             </a:r>
             <a:r>
               <a:rPr lang="fi-FI" dirty="0" smtClean="0"/>
-              <a:t>, </a:t>
+              <a:t> </a:t>
             </a:r>
             <a:r>
               <a:rPr lang="fi-FI" dirty="0" err="1" smtClean="0"/>
-              <a:t>working</a:t>
+              <a:t>capable</a:t>
             </a:r>
             <a:r>
               <a:rPr lang="fi-FI" dirty="0" smtClean="0"/>
-              <a:t> video </a:t>
+              <a:t> to </a:t>
             </a:r>
             <a:r>
               <a:rPr lang="fi-FI" dirty="0" err="1" smtClean="0"/>
-              <a:t>stream</a:t>
-            </a:r>
-            <a:r>
-              <a:rPr lang="fi-FI" dirty="0" smtClean="0"/>
-              <a:t> and </a:t>
-            </a:r>
-            <a:r>
-              <a:rPr lang="fi-FI" dirty="0" err="1" smtClean="0"/>
-              <a:t>user</a:t>
+              <a:t>deliver</a:t>
             </a:r>
             <a:r>
               <a:rPr lang="fi-FI" dirty="0" smtClean="0"/>
@@ -6386,7 +6998,15 @@
             </a:r>
             <a:r>
               <a:rPr lang="fi-FI" dirty="0" err="1" smtClean="0"/>
-              <a:t>controls</a:t>
+              <a:t>games</a:t>
+            </a:r>
+            <a:r>
+              <a:rPr lang="fi-FI" dirty="0" smtClean="0"/>
+              <a:t> to </a:t>
+            </a:r>
+            <a:r>
+              <a:rPr lang="fi-FI" dirty="0" err="1" smtClean="0"/>
+              <a:t>low-end</a:t>
             </a:r>
             <a:r>
               <a:rPr lang="fi-FI" dirty="0" smtClean="0"/>
@@ -6394,143 +7014,57 @@
             </a:r>
             <a:r>
               <a:rPr lang="fi-FI" dirty="0" err="1" smtClean="0"/>
-              <a:t>transmit</a:t>
+              <a:t>client</a:t>
             </a:r>
             <a:r>
               <a:rPr lang="fi-FI" dirty="0" smtClean="0"/>
               <a:t>.</a:t>
             </a:r>
-          </a:p>
-          <a:p>
             <a:endParaRPr lang="fi-FI" dirty="0" smtClean="0"/>
           </a:p>
           <a:p>
-            <a:r>
-              <a:rPr lang="fi-FI" dirty="0" err="1" smtClean="0"/>
-              <a:t>Client</a:t>
-            </a:r>
             <a:endParaRPr lang="fi-FI" dirty="0" smtClean="0"/>
           </a:p>
-          <a:p>
-            <a:pPr lvl="1"/>
-            <a:r>
-              <a:rPr lang="fi-FI" dirty="0" err="1" smtClean="0"/>
-              <a:t>Simple</a:t>
-            </a:r>
-            <a:r>
-              <a:rPr lang="fi-FI" dirty="0" smtClean="0"/>
-              <a:t> GUI </a:t>
-            </a:r>
-            <a:r>
-              <a:rPr lang="fi-FI" dirty="0" err="1" smtClean="0"/>
-              <a:t>built</a:t>
-            </a:r>
-            <a:r>
-              <a:rPr lang="fi-FI" dirty="0" smtClean="0"/>
-              <a:t> on </a:t>
-            </a:r>
-            <a:r>
-              <a:rPr lang="fi-FI" dirty="0" err="1" smtClean="0"/>
-              <a:t>Qt</a:t>
-            </a:r>
-            <a:r>
-              <a:rPr lang="fi-FI" dirty="0" smtClean="0"/>
-              <a:t> </a:t>
-            </a:r>
-            <a:r>
-              <a:rPr lang="fi-FI" dirty="0" err="1" smtClean="0"/>
-              <a:t>allowing</a:t>
-            </a:r>
-            <a:r>
-              <a:rPr lang="fi-FI" dirty="0" smtClean="0"/>
-              <a:t> </a:t>
-            </a:r>
-            <a:r>
-              <a:rPr lang="fi-FI" dirty="0" err="1" smtClean="0"/>
-              <a:t>portability</a:t>
-            </a:r>
-            <a:r>
-              <a:rPr lang="fi-FI" dirty="0" smtClean="0"/>
-              <a:t> </a:t>
-            </a:r>
-            <a:r>
-              <a:rPr lang="fi-FI" dirty="0" err="1" smtClean="0"/>
-              <a:t>between</a:t>
-            </a:r>
-            <a:r>
-              <a:rPr lang="fi-FI" dirty="0" smtClean="0"/>
-              <a:t> Linux and Windows</a:t>
-            </a:r>
-          </a:p>
-          <a:p>
-            <a:r>
-              <a:rPr lang="fi-FI" dirty="0" smtClean="0"/>
-              <a:t>Server</a:t>
-            </a:r>
-          </a:p>
-          <a:p>
-            <a:pPr lvl="1"/>
-            <a:r>
-              <a:rPr lang="fi-FI" dirty="0" err="1" smtClean="0"/>
-              <a:t>Inputserver</a:t>
-            </a:r>
-            <a:r>
-              <a:rPr lang="fi-FI" dirty="0" smtClean="0"/>
-              <a:t> to </a:t>
-            </a:r>
-            <a:r>
-              <a:rPr lang="fi-FI" dirty="0" err="1" smtClean="0"/>
-              <a:t>receive</a:t>
-            </a:r>
-            <a:r>
-              <a:rPr lang="fi-FI" dirty="0" smtClean="0"/>
-              <a:t> </a:t>
-            </a:r>
-            <a:r>
-              <a:rPr lang="fi-FI" dirty="0" err="1" smtClean="0"/>
-              <a:t>commands</a:t>
-            </a:r>
-            <a:r>
-              <a:rPr lang="fi-FI" dirty="0" smtClean="0"/>
-              <a:t> and </a:t>
-            </a:r>
-            <a:r>
-              <a:rPr lang="fi-FI" dirty="0" err="1" smtClean="0"/>
-              <a:t>scripts</a:t>
-            </a:r>
-            <a:r>
-              <a:rPr lang="fi-FI" dirty="0" smtClean="0"/>
-              <a:t> to </a:t>
-            </a:r>
-            <a:r>
-              <a:rPr lang="fi-FI" dirty="0" err="1" smtClean="0"/>
-              <a:t>make</a:t>
-            </a:r>
-            <a:r>
-              <a:rPr lang="fi-FI" dirty="0" smtClean="0"/>
-              <a:t> </a:t>
-            </a:r>
-            <a:r>
-              <a:rPr lang="fi-FI" dirty="0" err="1" smtClean="0"/>
-              <a:t>use</a:t>
-            </a:r>
-            <a:r>
-              <a:rPr lang="fi-FI" dirty="0" smtClean="0"/>
-              <a:t> of GLC &amp; </a:t>
-            </a:r>
-            <a:r>
-              <a:rPr lang="fi-FI" dirty="0" err="1" smtClean="0"/>
-              <a:t>FFmpeg</a:t>
-            </a:r>
-            <a:endParaRPr lang="fi-FI" dirty="0" smtClean="0"/>
-          </a:p>
         </p:txBody>
       </p:sp>
+      <p:pic>
+        <p:nvPicPr>
+          <p:cNvPr id="1026" name="Picture 2" descr="D:\Opiskelu\Multimediajärjestelmät\GIT\docs\system_architecture.png"/>
+          <p:cNvPicPr>
+            <a:picLocks noChangeAspect="1" noChangeArrowheads="1"/>
+          </p:cNvPicPr>
+          <p:nvPr/>
+        </p:nvPicPr>
+        <p:blipFill>
+          <a:blip r:embed="rId3" cstate="print"/>
+          <a:srcRect/>
+          <a:stretch>
+            <a:fillRect/>
+          </a:stretch>
+        </p:blipFill>
+        <p:spPr bwMode="auto">
+          <a:xfrm>
+            <a:off x="141367" y="2867025"/>
+            <a:ext cx="8802608" cy="2919413"/>
+          </a:xfrm>
+          <a:prstGeom prst="rect">
+            <a:avLst/>
+          </a:prstGeom>
+          <a:noFill/>
+        </p:spPr>
+      </p:pic>
     </p:spTree>
   </p:cSld>
   <p:clrMapOvr>
     <a:masterClrMapping/>
   </p:clrMapOvr>
+  <p:timing>
+    <p:tnLst>
+      <p:par>
+        <p:cTn id="1" dur="indefinite" restart="never" nodeType="tmRoot"/>
+      </p:par>
+    </p:tnLst>
+  </p:timing>
 </p:sld>
 </file>
 
@@ -6567,12 +7101,8 @@
           <a:lstStyle/>
           <a:p>
             <a:r>
-              <a:rPr lang="fi-FI" dirty="0" smtClean="0"/>
-              <a:t>Technologies </a:t>
-            </a:r>
-            <a:r>
               <a:rPr lang="fi-FI" dirty="0" err="1" smtClean="0"/>
-              <a:t>used</a:t>
+              <a:t>Client</a:t>
             </a:r>
             <a:endParaRPr lang="fi-FI" dirty="0"/>
           </a:p>
@@ -6594,11 +7124,29 @@
           <a:lstStyle/>
           <a:p>
             <a:r>
+              <a:rPr lang="fi-FI" dirty="0" err="1" smtClean="0"/>
+              <a:t>Simple</a:t>
+            </a:r>
+            <a:r>
               <a:rPr lang="fi-FI" dirty="0" smtClean="0"/>
-              <a:t>SCRUM</a:t>
-            </a:r>
-          </a:p>
-          <a:p>
+              <a:t> GUI </a:t>
+            </a:r>
+            <a:r>
+              <a:rPr lang="fi-FI" dirty="0" err="1" smtClean="0"/>
+              <a:t>built</a:t>
+            </a:r>
+            <a:r>
+              <a:rPr lang="fi-FI" dirty="0" smtClean="0"/>
+              <a:t> </a:t>
+            </a:r>
+            <a:r>
+              <a:rPr lang="fi-FI" dirty="0" err="1" smtClean="0"/>
+              <a:t>with</a:t>
+            </a:r>
+            <a:r>
+              <a:rPr lang="fi-FI" dirty="0" smtClean="0"/>
+              <a:t> </a:t>
+            </a:r>
             <a:r>
               <a:rPr lang="fi-FI" dirty="0" err="1" smtClean="0"/>
               <a:t>Qt</a:t>
@@ -6606,41 +7154,48 @@
             <a:endParaRPr lang="fi-FI" dirty="0" smtClean="0"/>
           </a:p>
           <a:p>
-            <a:r>
-              <a:rPr lang="fi-FI" dirty="0" err="1" smtClean="0"/>
-              <a:t>LibVLC</a:t>
-            </a:r>
-            <a:endParaRPr lang="fi-FI" dirty="0" smtClean="0"/>
-          </a:p>
-          <a:p>
-            <a:r>
-              <a:rPr lang="fi-FI" dirty="0" smtClean="0"/>
-              <a:t>GLC</a:t>
-            </a:r>
-          </a:p>
-          <a:p>
-            <a:r>
-              <a:rPr lang="fi-FI" dirty="0" err="1" smtClean="0"/>
-              <a:t>FFmpeg</a:t>
-            </a:r>
-            <a:endParaRPr lang="fi-FI" dirty="0" smtClean="0"/>
-          </a:p>
-          <a:p>
-            <a:r>
-              <a:rPr lang="fi-FI" dirty="0" smtClean="0"/>
-              <a:t>H263+</a:t>
-            </a:r>
-          </a:p>
-          <a:p>
             <a:endParaRPr lang="fi-FI" dirty="0"/>
           </a:p>
         </p:txBody>
       </p:sp>
+      <p:pic>
+        <p:nvPicPr>
+          <p:cNvPr id="2050" name="Picture 2" descr="D:\Opiskelu\Multimediajärjestelmät\GIT\docs\ui.jpg"/>
+          <p:cNvPicPr>
+            <a:picLocks noChangeAspect="1" noChangeArrowheads="1"/>
+          </p:cNvPicPr>
+          <p:nvPr/>
+        </p:nvPicPr>
+        <p:blipFill>
+          <a:blip r:embed="rId3" cstate="print"/>
+          <a:srcRect/>
+          <a:stretch>
+            <a:fillRect/>
+          </a:stretch>
+        </p:blipFill>
+        <p:spPr bwMode="auto">
+          <a:xfrm>
+            <a:off x="1909762" y="2314574"/>
+            <a:ext cx="5317205" cy="4162425"/>
+          </a:xfrm>
+          <a:prstGeom prst="rect">
+            <a:avLst/>
+          </a:prstGeom>
+          <a:noFill/>
+        </p:spPr>
+      </p:pic>
     </p:spTree>
   </p:cSld>
   <p:clrMapOvr>
     <a:masterClrMapping/>
   </p:clrMapOvr>
+  <p:timing>
+    <p:tnLst>
+      <p:par>
+        <p:cTn id="1" dur="indefinite" restart="never" nodeType="tmRoot"/>
+      </p:par>
+    </p:tnLst>
+  </p:timing>
 </p:sld>
 </file>
 
@@ -6663,7 +7218,7 @@
       </p:grpSpPr>
       <p:sp>
         <p:nvSpPr>
-          <p:cNvPr id="345090" name="Rectangle 2"/>
+          <p:cNvPr id="343042" name="Rectangle 2"/>
           <p:cNvSpPr>
             <a:spLocks noGrp="1" noChangeArrowheads="1"/>
           </p:cNvSpPr>
@@ -6677,15 +7232,16 @@
           <a:lstStyle/>
           <a:p>
             <a:r>
-              <a:rPr lang="fi-FI"/>
-              <a:t>Solutions</a:t>
-            </a:r>
+              <a:rPr lang="fi-FI" dirty="0" smtClean="0"/>
+              <a:t>Server</a:t>
+            </a:r>
+            <a:endParaRPr lang="fi-FI" dirty="0"/>
           </a:p>
         </p:txBody>
       </p:sp>
       <p:sp>
         <p:nvSpPr>
-          <p:cNvPr id="345091" name="Rectangle 3"/>
+          <p:cNvPr id="343043" name="Rectangle 3"/>
           <p:cNvSpPr>
             <a:spLocks noGrp="1" noChangeArrowheads="1"/>
           </p:cNvSpPr>
@@ -6699,8 +7255,15 @@
           <a:lstStyle/>
           <a:p>
             <a:r>
+              <a:rPr lang="fi-FI" dirty="0" smtClean="0"/>
+              <a:t>Server</a:t>
+            </a:r>
+          </a:p>
+          <a:p>
+            <a:pPr lvl="1"/>
+            <a:r>
               <a:rPr lang="fi-FI" dirty="0" err="1" smtClean="0"/>
-              <a:t>Client</a:t>
+              <a:t>Inputserver</a:t>
             </a:r>
             <a:r>
               <a:rPr lang="fi-FI" dirty="0" smtClean="0"/>
@@ -6708,7 +7271,31 @@
             </a:r>
             <a:r>
               <a:rPr lang="fi-FI" dirty="0" err="1" smtClean="0"/>
-              <a:t>uses</a:t>
+              <a:t>script</a:t>
+            </a:r>
+            <a:endParaRPr lang="fi-FI" dirty="0" smtClean="0"/>
+          </a:p>
+          <a:p>
+            <a:pPr lvl="1"/>
+            <a:r>
+              <a:rPr lang="fi-FI" dirty="0" err="1" smtClean="0"/>
+              <a:t>Game</a:t>
+            </a:r>
+            <a:endParaRPr lang="fi-FI" dirty="0" smtClean="0"/>
+          </a:p>
+          <a:p>
+            <a:pPr lvl="1"/>
+            <a:r>
+              <a:rPr lang="fi-FI" dirty="0" err="1" smtClean="0"/>
+              <a:t>Stream</a:t>
+            </a:r>
+            <a:endParaRPr lang="fi-FI" dirty="0" smtClean="0"/>
+          </a:p>
+          <a:p>
+            <a:pPr lvl="1"/>
+            <a:r>
+              <a:rPr lang="fi-FI" dirty="0" err="1" smtClean="0"/>
+              <a:t>User</a:t>
             </a:r>
             <a:r>
               <a:rPr lang="fi-FI" dirty="0" smtClean="0"/>
@@ -6716,33 +7303,7 @@
             </a:r>
             <a:r>
               <a:rPr lang="fi-FI" dirty="0" err="1" smtClean="0"/>
-              <a:t>LibVLC</a:t>
-            </a:r>
-            <a:r>
-              <a:rPr lang="fi-FI" dirty="0" smtClean="0"/>
-              <a:t> to </a:t>
-            </a:r>
-            <a:r>
-              <a:rPr lang="fi-FI" dirty="0" err="1" smtClean="0"/>
-              <a:t>view</a:t>
-            </a:r>
-            <a:r>
-              <a:rPr lang="fi-FI" dirty="0" smtClean="0"/>
-              <a:t> the video </a:t>
-            </a:r>
-            <a:r>
-              <a:rPr lang="fi-FI" dirty="0" err="1" smtClean="0"/>
-              <a:t>stream</a:t>
-            </a:r>
-            <a:endParaRPr lang="fi-FI" dirty="0" smtClean="0"/>
-          </a:p>
-          <a:p>
-            <a:endParaRPr lang="fi-FI" dirty="0" smtClean="0"/>
-          </a:p>
-          <a:p>
-            <a:r>
-              <a:rPr lang="fi-FI" dirty="0" err="1" smtClean="0"/>
-              <a:t>We</a:t>
+              <a:t>controls</a:t>
             </a:r>
             <a:r>
               <a:rPr lang="fi-FI" dirty="0" smtClean="0"/>
@@ -6750,139 +7311,11 @@
             </a:r>
             <a:r>
               <a:rPr lang="fi-FI" dirty="0" err="1" smtClean="0"/>
-              <a:t>use</a:t>
-            </a:r>
-            <a:r>
-              <a:rPr lang="fi-FI" dirty="0" smtClean="0"/>
-              <a:t> </a:t>
-            </a:r>
-            <a:r>
-              <a:rPr lang="fi-FI" dirty="0" err="1" smtClean="0"/>
-              <a:t>pipes</a:t>
-            </a:r>
-            <a:r>
-              <a:rPr lang="fi-FI" dirty="0" smtClean="0"/>
-              <a:t> to </a:t>
-            </a:r>
-            <a:r>
-              <a:rPr lang="fi-FI" dirty="0" err="1" smtClean="0"/>
-              <a:t>encode</a:t>
-            </a:r>
-            <a:r>
-              <a:rPr lang="fi-FI" dirty="0" smtClean="0"/>
-              <a:t> and </a:t>
-            </a:r>
-            <a:r>
-              <a:rPr lang="fi-FI" dirty="0" err="1" smtClean="0"/>
-              <a:t>stream</a:t>
-            </a:r>
-            <a:r>
-              <a:rPr lang="fi-FI" dirty="0" smtClean="0"/>
-              <a:t> video </a:t>
-            </a:r>
-            <a:r>
-              <a:rPr lang="fi-FI" dirty="0" err="1" smtClean="0"/>
-              <a:t>without</a:t>
-            </a:r>
-            <a:r>
-              <a:rPr lang="fi-FI" dirty="0" smtClean="0"/>
-              <a:t> a </a:t>
-            </a:r>
-            <a:r>
-              <a:rPr lang="fi-FI" dirty="0" err="1" smtClean="0"/>
-              <a:t>file</a:t>
-            </a:r>
-            <a:r>
-              <a:rPr lang="fi-FI" dirty="0" smtClean="0"/>
-              <a:t> </a:t>
-            </a:r>
-            <a:r>
-              <a:rPr lang="fi-FI" dirty="0" err="1" smtClean="0"/>
-              <a:t>buffer</a:t>
-            </a:r>
-            <a:r>
-              <a:rPr lang="fi-FI" dirty="0" smtClean="0"/>
-              <a:t>.</a:t>
+              <a:t>receiving</a:t>
             </a:r>
             <a:endParaRPr lang="fi-FI" dirty="0" smtClean="0"/>
           </a:p>
           <a:p>
-            <a:pPr>
-              <a:buNone/>
-            </a:pPr>
-            <a:endParaRPr lang="fi-FI" dirty="0" smtClean="0"/>
-          </a:p>
-          <a:p>
-            <a:r>
-              <a:rPr lang="fi-FI" dirty="0" smtClean="0"/>
-              <a:t>Server is </a:t>
-            </a:r>
-            <a:r>
-              <a:rPr lang="fi-FI" dirty="0" err="1" smtClean="0"/>
-              <a:t>scripted</a:t>
-            </a:r>
-            <a:r>
-              <a:rPr lang="fi-FI" dirty="0" smtClean="0"/>
-              <a:t> to </a:t>
-            </a:r>
-            <a:r>
-              <a:rPr lang="fi-FI" dirty="0" err="1" smtClean="0"/>
-              <a:t>start</a:t>
-            </a:r>
-            <a:r>
-              <a:rPr lang="fi-FI" dirty="0" smtClean="0"/>
-              <a:t> </a:t>
-            </a:r>
-            <a:r>
-              <a:rPr lang="fi-FI" dirty="0" err="1" smtClean="0"/>
-              <a:t>streaming</a:t>
-            </a:r>
-            <a:r>
-              <a:rPr lang="fi-FI" dirty="0" smtClean="0"/>
-              <a:t> </a:t>
-            </a:r>
-            <a:r>
-              <a:rPr lang="fi-FI" dirty="0" err="1" smtClean="0"/>
-              <a:t>when</a:t>
-            </a:r>
-            <a:r>
-              <a:rPr lang="fi-FI" dirty="0" smtClean="0"/>
-              <a:t> </a:t>
-            </a:r>
-            <a:r>
-              <a:rPr lang="fi-FI" dirty="0" err="1" smtClean="0"/>
-              <a:t>client</a:t>
-            </a:r>
-            <a:r>
-              <a:rPr lang="fi-FI" dirty="0" smtClean="0"/>
-              <a:t> </a:t>
-            </a:r>
-            <a:r>
-              <a:rPr lang="fi-FI" dirty="0" err="1" smtClean="0"/>
-              <a:t>sends</a:t>
-            </a:r>
-            <a:r>
-              <a:rPr lang="fi-FI" dirty="0" smtClean="0"/>
-              <a:t> the ’</a:t>
-            </a:r>
-            <a:r>
-              <a:rPr lang="fi-FI" dirty="0" err="1" smtClean="0"/>
-              <a:t>Start</a:t>
-            </a:r>
-            <a:r>
-              <a:rPr lang="fi-FI" dirty="0" smtClean="0"/>
-              <a:t>’ </a:t>
-            </a:r>
-            <a:r>
-              <a:rPr lang="fi-FI" dirty="0" err="1" smtClean="0"/>
-              <a:t>command</a:t>
-            </a:r>
-            <a:endParaRPr lang="fi-FI" dirty="0" smtClean="0"/>
-          </a:p>
-          <a:p>
-            <a:pPr>
-              <a:buNone/>
-            </a:pPr>
             <a:endParaRPr lang="fi-FI" dirty="0"/>
           </a:p>
         </p:txBody>
@@ -6892,6 +7325,13 @@
   <p:clrMapOvr>
     <a:masterClrMapping/>
   </p:clrMapOvr>
+  <p:timing>
+    <p:tnLst>
+      <p:par>
+        <p:cTn id="1" dur="indefinite" restart="never" nodeType="tmRoot"/>
+      </p:par>
+    </p:tnLst>
+  </p:timing>
 </p:sld>
 </file>
 
@@ -6914,7 +7354,7 @@
       </p:grpSpPr>
       <p:sp>
         <p:nvSpPr>
-          <p:cNvPr id="347138" name="Rectangle 2"/>
+          <p:cNvPr id="343042" name="Rectangle 2"/>
           <p:cNvSpPr>
             <a:spLocks noGrp="1" noChangeArrowheads="1"/>
           </p:cNvSpPr>
@@ -6928,192 +7368,55 @@
           <a:lstStyle/>
           <a:p>
             <a:r>
-              <a:rPr lang="fi-FI"/>
-              <a:t>Results</a:t>
-            </a:r>
+              <a:rPr lang="fi-FI" dirty="0" smtClean="0"/>
+              <a:t>Technologies </a:t>
+            </a:r>
+            <a:r>
+              <a:rPr lang="fi-FI" dirty="0" err="1" smtClean="0"/>
+              <a:t>used</a:t>
+            </a:r>
+            <a:endParaRPr lang="fi-FI" dirty="0"/>
           </a:p>
         </p:txBody>
       </p:sp>
-      <p:sp>
-        <p:nvSpPr>
-          <p:cNvPr id="347139" name="Rectangle 3"/>
-          <p:cNvSpPr>
-            <a:spLocks noGrp="1" noChangeArrowheads="1"/>
-          </p:cNvSpPr>
-          <p:nvPr>
-            <p:ph type="body" idx="1"/>
-          </p:nvPr>
-        </p:nvSpPr>
-        <p:spPr/>
-        <p:txBody>
-          <a:bodyPr/>
-          <a:lstStyle/>
-          <a:p>
-            <a:r>
-              <a:rPr lang="fi-FI" dirty="0" err="1" smtClean="0"/>
-              <a:t>Playable</a:t>
-            </a:r>
-            <a:r>
-              <a:rPr lang="fi-FI" dirty="0" smtClean="0"/>
-              <a:t> </a:t>
-            </a:r>
-            <a:r>
-              <a:rPr lang="fi-FI" dirty="0" err="1" smtClean="0"/>
-              <a:t>cloud</a:t>
-            </a:r>
-            <a:r>
-              <a:rPr lang="fi-FI" dirty="0" smtClean="0"/>
-              <a:t> </a:t>
-            </a:r>
-            <a:r>
-              <a:rPr lang="fi-FI" dirty="0" err="1" smtClean="0"/>
-              <a:t>game</a:t>
-            </a:r>
-            <a:r>
-              <a:rPr lang="fi-FI" dirty="0" smtClean="0"/>
-              <a:t> on </a:t>
-            </a:r>
-            <a:r>
-              <a:rPr lang="fi-FI" dirty="0" err="1" smtClean="0"/>
-              <a:t>performance</a:t>
-            </a:r>
-            <a:r>
-              <a:rPr lang="fi-FI" dirty="0" smtClean="0"/>
-              <a:t> </a:t>
-            </a:r>
-            <a:r>
-              <a:rPr lang="fi-FI" dirty="0" err="1" smtClean="0"/>
-              <a:t>platform</a:t>
-            </a:r>
-            <a:endParaRPr lang="fi-FI" dirty="0" smtClean="0"/>
-          </a:p>
-          <a:p>
-            <a:r>
-              <a:rPr lang="fi-FI" dirty="0" err="1" smtClean="0"/>
-              <a:t>Game</a:t>
-            </a:r>
-            <a:r>
-              <a:rPr lang="fi-FI" dirty="0" smtClean="0"/>
-              <a:t> </a:t>
-            </a:r>
-            <a:r>
-              <a:rPr lang="fi-FI" dirty="0" err="1" smtClean="0"/>
-              <a:t>running</a:t>
-            </a:r>
-            <a:r>
-              <a:rPr lang="fi-FI" dirty="0" smtClean="0"/>
-              <a:t> and video </a:t>
-            </a:r>
-            <a:r>
-              <a:rPr lang="fi-FI" dirty="0" err="1" smtClean="0"/>
-              <a:t>streaming</a:t>
-            </a:r>
-            <a:r>
-              <a:rPr lang="fi-FI" dirty="0" smtClean="0"/>
-              <a:t> </a:t>
-            </a:r>
-            <a:r>
-              <a:rPr lang="fi-FI" dirty="0" err="1" smtClean="0"/>
-              <a:t>are</a:t>
-            </a:r>
-            <a:r>
-              <a:rPr lang="fi-FI" dirty="0" smtClean="0"/>
-              <a:t> </a:t>
-            </a:r>
-            <a:r>
-              <a:rPr lang="fi-FI" dirty="0" err="1" smtClean="0"/>
-              <a:t>power</a:t>
-            </a:r>
-            <a:r>
-              <a:rPr lang="fi-FI" dirty="0" smtClean="0"/>
-              <a:t> </a:t>
-            </a:r>
-            <a:r>
-              <a:rPr lang="fi-FI" dirty="0" err="1" smtClean="0"/>
-              <a:t>consuming</a:t>
-            </a:r>
-            <a:r>
-              <a:rPr lang="fi-FI" dirty="0" smtClean="0"/>
-              <a:t>.</a:t>
-            </a:r>
-          </a:p>
-          <a:p>
-            <a:r>
-              <a:rPr lang="fi-FI" dirty="0" err="1" smtClean="0"/>
-              <a:t>High</a:t>
-            </a:r>
-            <a:r>
-              <a:rPr lang="fi-FI" dirty="0" smtClean="0"/>
-              <a:t> </a:t>
-            </a:r>
-            <a:r>
-              <a:rPr lang="fi-FI" dirty="0" err="1" smtClean="0"/>
-              <a:t>bandwidth</a:t>
-            </a:r>
-            <a:r>
-              <a:rPr lang="fi-FI" dirty="0" smtClean="0"/>
-              <a:t> is </a:t>
-            </a:r>
-            <a:r>
-              <a:rPr lang="fi-FI" dirty="0" err="1" smtClean="0"/>
-              <a:t>needed</a:t>
-            </a:r>
-            <a:r>
-              <a:rPr lang="fi-FI" dirty="0" smtClean="0"/>
-              <a:t> to </a:t>
-            </a:r>
-            <a:r>
-              <a:rPr lang="fi-FI" dirty="0" err="1" smtClean="0"/>
-              <a:t>achieve</a:t>
-            </a:r>
-            <a:r>
-              <a:rPr lang="fi-FI" dirty="0" smtClean="0"/>
-              <a:t> </a:t>
-            </a:r>
-            <a:r>
-              <a:rPr lang="fi-FI" dirty="0" err="1" smtClean="0"/>
-              <a:t>good</a:t>
-            </a:r>
-            <a:r>
-              <a:rPr lang="fi-FI" dirty="0" smtClean="0"/>
-              <a:t> </a:t>
-            </a:r>
-            <a:r>
-              <a:rPr lang="fi-FI" dirty="0" err="1" smtClean="0"/>
-              <a:t>stream</a:t>
-            </a:r>
-            <a:r>
-              <a:rPr lang="fi-FI" dirty="0" smtClean="0"/>
-              <a:t> </a:t>
-            </a:r>
-            <a:r>
-              <a:rPr lang="fi-FI" dirty="0" err="1" smtClean="0"/>
-              <a:t>quality</a:t>
-            </a:r>
-            <a:endParaRPr lang="fi-FI" dirty="0" smtClean="0"/>
-          </a:p>
-          <a:p>
-            <a:r>
-              <a:rPr lang="fi-FI" dirty="0" err="1" smtClean="0"/>
-              <a:t>Latency</a:t>
-            </a:r>
-            <a:r>
-              <a:rPr lang="fi-FI" dirty="0" smtClean="0"/>
-              <a:t> is the main </a:t>
-            </a:r>
-            <a:r>
-              <a:rPr lang="fi-FI" dirty="0" err="1" smtClean="0"/>
-              <a:t>issue</a:t>
-            </a:r>
-            <a:endParaRPr lang="fi-FI" dirty="0"/>
-          </a:p>
-        </p:txBody>
-      </p:sp>
+      <p:pic>
+        <p:nvPicPr>
+          <p:cNvPr id="4098" name="Picture 2" descr="D:\Opiskelu\Multimediajärjestelmät\GIT\docs\component diagram.png"/>
+          <p:cNvPicPr>
+            <a:picLocks noChangeAspect="1" noChangeArrowheads="1"/>
+          </p:cNvPicPr>
+          <p:nvPr/>
+        </p:nvPicPr>
+        <p:blipFill>
+          <a:blip r:embed="rId3" cstate="print"/>
+          <a:srcRect/>
+          <a:stretch>
+            <a:fillRect/>
+          </a:stretch>
+        </p:blipFill>
+        <p:spPr bwMode="auto">
+          <a:xfrm>
+            <a:off x="1724025" y="1028700"/>
+            <a:ext cx="5372100" cy="5181600"/>
+          </a:xfrm>
+          <a:prstGeom prst="rect">
+            <a:avLst/>
+          </a:prstGeom>
+          <a:noFill/>
+        </p:spPr>
+      </p:pic>
     </p:spTree>
   </p:cSld>
   <p:clrMapOvr>
     <a:masterClrMapping/>
   </p:clrMapOvr>
+  <p:timing>
+    <p:tnLst>
+      <p:par>
+        <p:cTn id="1" dur="indefinite" restart="never" nodeType="tmRoot"/>
+      </p:par>
+    </p:tnLst>
+  </p:timing>
 </p:sld>
 </file>
 
@@ -7136,7 +7439,7 @@
       </p:grpSpPr>
       <p:sp>
         <p:nvSpPr>
-          <p:cNvPr id="349186" name="Rectangle 2"/>
+          <p:cNvPr id="345090" name="Rectangle 2"/>
           <p:cNvSpPr>
             <a:spLocks noGrp="1" noChangeArrowheads="1"/>
           </p:cNvSpPr>
@@ -7150,15 +7453,15 @@
           <a:lstStyle/>
           <a:p>
             <a:r>
-              <a:rPr lang="fi-FI"/>
-              <a:t>Experiences</a:t>
+              <a:rPr lang="fi-FI" dirty="0"/>
+              <a:t>Solutions</a:t>
             </a:r>
           </a:p>
         </p:txBody>
       </p:sp>
       <p:sp>
         <p:nvSpPr>
-          <p:cNvPr id="349187" name="Rectangle 3"/>
+          <p:cNvPr id="345091" name="Rectangle 3"/>
           <p:cNvSpPr>
             <a:spLocks noGrp="1" noChangeArrowheads="1"/>
           </p:cNvSpPr>
@@ -7173,7 +7476,7 @@
           <a:p>
             <a:r>
               <a:rPr lang="fi-FI" dirty="0" err="1" smtClean="0"/>
-              <a:t>Stream</a:t>
+              <a:t>Client</a:t>
             </a:r>
             <a:r>
               <a:rPr lang="fi-FI" dirty="0" smtClean="0"/>
@@ -7181,7 +7484,69 @@
             </a:r>
             <a:r>
               <a:rPr lang="fi-FI" dirty="0" err="1" smtClean="0"/>
-              <a:t>quality</a:t>
+              <a:t>uses</a:t>
+            </a:r>
+            <a:r>
+              <a:rPr lang="fi-FI" dirty="0" smtClean="0"/>
+              <a:t> </a:t>
+            </a:r>
+            <a:r>
+              <a:rPr lang="fi-FI" dirty="0" err="1" smtClean="0"/>
+              <a:t>LibVLC</a:t>
+            </a:r>
+            <a:r>
+              <a:rPr lang="fi-FI" dirty="0" smtClean="0"/>
+              <a:t> to </a:t>
+            </a:r>
+            <a:r>
+              <a:rPr lang="fi-FI" dirty="0" err="1" smtClean="0"/>
+              <a:t>view</a:t>
+            </a:r>
+            <a:r>
+              <a:rPr lang="fi-FI" dirty="0" smtClean="0"/>
+              <a:t> the video </a:t>
+            </a:r>
+            <a:r>
+              <a:rPr lang="fi-FI" dirty="0" err="1" smtClean="0"/>
+              <a:t>stream</a:t>
+            </a:r>
+            <a:endParaRPr lang="fi-FI" dirty="0" smtClean="0"/>
+          </a:p>
+          <a:p>
+            <a:endParaRPr lang="fi-FI" dirty="0" smtClean="0"/>
+          </a:p>
+          <a:p>
+            <a:r>
+              <a:rPr lang="fi-FI" dirty="0" err="1" smtClean="0"/>
+              <a:t>Operating</a:t>
+            </a:r>
+            <a:r>
+              <a:rPr lang="fi-FI" dirty="0" smtClean="0"/>
+              <a:t> </a:t>
+            </a:r>
+            <a:r>
+              <a:rPr lang="fi-FI" dirty="0" err="1" smtClean="0"/>
+              <a:t>system</a:t>
+            </a:r>
+            <a:r>
+              <a:rPr lang="fi-FI" dirty="0" smtClean="0"/>
+              <a:t> </a:t>
+            </a:r>
+            <a:r>
+              <a:rPr lang="fi-FI" dirty="0" err="1" smtClean="0"/>
+              <a:t>pipes</a:t>
+            </a:r>
+            <a:r>
+              <a:rPr lang="fi-FI" dirty="0" smtClean="0"/>
+              <a:t> </a:t>
+            </a:r>
+            <a:r>
+              <a:rPr lang="fi-FI" dirty="0" smtClean="0"/>
+              <a:t>to </a:t>
+            </a:r>
+            <a:r>
+              <a:rPr lang="fi-FI" dirty="0" err="1" smtClean="0"/>
+              <a:t>encode</a:t>
             </a:r>
             <a:r>
               <a:rPr lang="fi-FI" dirty="0" smtClean="0"/>
@@ -7189,7 +7554,23 @@
             </a:r>
             <a:r>
               <a:rPr lang="fi-FI" dirty="0" err="1" smtClean="0"/>
-              <a:t>optimizing</a:t>
+              <a:t>stream</a:t>
+            </a:r>
+            <a:r>
+              <a:rPr lang="fi-FI" dirty="0" smtClean="0"/>
+              <a:t> video </a:t>
+            </a:r>
+            <a:r>
+              <a:rPr lang="fi-FI" dirty="0" err="1" smtClean="0"/>
+              <a:t>without</a:t>
+            </a:r>
+            <a:r>
+              <a:rPr lang="fi-FI" dirty="0" smtClean="0"/>
+              <a:t> a </a:t>
+            </a:r>
+            <a:r>
+              <a:rPr lang="fi-FI" dirty="0" err="1" smtClean="0"/>
+              <a:t>file</a:t>
             </a:r>
             <a:r>
               <a:rPr lang="fi-FI" dirty="0" smtClean="0"/>
@@ -7197,140 +7578,38 @@
             </a:r>
             <a:r>
               <a:rPr lang="fi-FI" dirty="0" err="1" smtClean="0"/>
-              <a:t>latency</a:t>
+              <a:t>buffer</a:t>
             </a:r>
             <a:r>
               <a:rPr lang="fi-FI" dirty="0" smtClean="0"/>
-              <a:t> </a:t>
-            </a:r>
+              <a:t>.</a:t>
+            </a:r>
+          </a:p>
+          <a:p>
+            <a:pPr>
+              <a:buNone/>
+            </a:pPr>
+            <a:endParaRPr lang="fi-FI" dirty="0" smtClean="0"/>
+          </a:p>
+          <a:p>
             <a:r>
               <a:rPr lang="fi-FI" dirty="0" err="1" smtClean="0"/>
-              <a:t>were</a:t>
+              <a:t>Automatic</a:t>
             </a:r>
             <a:r>
               <a:rPr lang="fi-FI" dirty="0" smtClean="0"/>
-              <a:t> main </a:t>
+              <a:t> act on </a:t>
             </a:r>
             <a:r>
               <a:rPr lang="fi-FI" dirty="0" err="1" smtClean="0"/>
-              <a:t>issues</a:t>
+              <a:t>connect</a:t>
             </a:r>
             <a:endParaRPr lang="fi-FI" dirty="0" smtClean="0"/>
           </a:p>
           <a:p>
-            <a:endParaRPr lang="fi-FI" dirty="0" smtClean="0"/>
-          </a:p>
-          <a:p>
-            <a:r>
-              <a:rPr lang="fi-FI" dirty="0" err="1" smtClean="0"/>
-              <a:t>Sending</a:t>
-            </a:r>
-            <a:r>
-              <a:rPr lang="fi-FI" dirty="0" smtClean="0"/>
-              <a:t> </a:t>
-            </a:r>
-            <a:r>
-              <a:rPr lang="fi-FI" dirty="0" err="1" smtClean="0"/>
-              <a:t>user</a:t>
-            </a:r>
-            <a:r>
-              <a:rPr lang="fi-FI" dirty="0" smtClean="0"/>
-              <a:t> </a:t>
-            </a:r>
-            <a:r>
-              <a:rPr lang="fi-FI" dirty="0" err="1" smtClean="0"/>
-              <a:t>commands</a:t>
-            </a:r>
-            <a:r>
-              <a:rPr lang="fi-FI" dirty="0" smtClean="0"/>
-              <a:t> </a:t>
-            </a:r>
-            <a:r>
-              <a:rPr lang="fi-FI" dirty="0" err="1" smtClean="0"/>
-              <a:t>was</a:t>
-            </a:r>
-            <a:r>
-              <a:rPr lang="fi-FI" dirty="0" smtClean="0"/>
-              <a:t> </a:t>
-            </a:r>
-            <a:r>
-              <a:rPr lang="fi-FI" dirty="0" err="1" smtClean="0"/>
-              <a:t>relatively</a:t>
-            </a:r>
-            <a:r>
-              <a:rPr lang="fi-FI" dirty="0" smtClean="0"/>
-              <a:t> </a:t>
-            </a:r>
-            <a:r>
-              <a:rPr lang="fi-FI" dirty="0" err="1" smtClean="0"/>
-              <a:t>easy</a:t>
-            </a:r>
-            <a:r>
-              <a:rPr lang="fi-FI" dirty="0" smtClean="0"/>
-              <a:t>, </a:t>
-            </a:r>
-            <a:r>
-              <a:rPr lang="fi-FI" dirty="0" err="1" smtClean="0"/>
-              <a:t>mouse</a:t>
-            </a:r>
-            <a:r>
-              <a:rPr lang="fi-FI" dirty="0" smtClean="0"/>
-              <a:t> </a:t>
-            </a:r>
-            <a:r>
-              <a:rPr lang="fi-FI" dirty="0" err="1" smtClean="0"/>
-              <a:t>had</a:t>
-            </a:r>
-            <a:r>
-              <a:rPr lang="fi-FI" dirty="0" smtClean="0"/>
-              <a:t> </a:t>
-            </a:r>
-            <a:r>
-              <a:rPr lang="fi-FI" dirty="0" err="1" smtClean="0"/>
-              <a:t>some</a:t>
-            </a:r>
-            <a:r>
-              <a:rPr lang="fi-FI" dirty="0" smtClean="0"/>
-              <a:t> </a:t>
-            </a:r>
-            <a:r>
-              <a:rPr lang="fi-FI" dirty="0" err="1" smtClean="0"/>
-              <a:t>problems</a:t>
-            </a:r>
-            <a:endParaRPr lang="fi-FI" dirty="0" smtClean="0"/>
-          </a:p>
-          <a:p>
-            <a:endParaRPr lang="fi-FI" dirty="0" smtClean="0"/>
-          </a:p>
-          <a:p>
-            <a:r>
-              <a:rPr lang="fi-FI" dirty="0" err="1" smtClean="0"/>
-              <a:t>Overall</a:t>
-            </a:r>
-            <a:r>
-              <a:rPr lang="fi-FI" dirty="0" smtClean="0"/>
-              <a:t> the </a:t>
-            </a:r>
-            <a:r>
-              <a:rPr lang="fi-FI" dirty="0" err="1" smtClean="0"/>
-              <a:t>project</a:t>
-            </a:r>
-            <a:r>
-              <a:rPr lang="fi-FI" dirty="0" smtClean="0"/>
-              <a:t> </a:t>
-            </a:r>
-            <a:r>
-              <a:rPr lang="fi-FI" dirty="0" err="1" smtClean="0"/>
-              <a:t>was</a:t>
-            </a:r>
-            <a:r>
-              <a:rPr lang="fi-FI" dirty="0" smtClean="0"/>
-              <a:t> </a:t>
-            </a:r>
-            <a:r>
-              <a:rPr lang="fi-FI" dirty="0" err="1" smtClean="0"/>
-              <a:t>challenging</a:t>
-            </a:r>
+            <a:pPr>
+              <a:buNone/>
+            </a:pPr>
             <a:endParaRPr lang="fi-FI" dirty="0"/>
           </a:p>
         </p:txBody>
@@ -7340,6 +7619,422 @@
   <p:clrMapOvr>
     <a:masterClrMapping/>
   </p:clrMapOvr>
+  <p:timing>
+    <p:tnLst>
+      <p:par>
+        <p:cTn id="1" dur="indefinite" restart="never" nodeType="tmRoot"/>
+      </p:par>
+    </p:tnLst>
+  </p:timing>
+</p:sld>
+</file>
+
+<file path=ppt/slides/slide7.xml><?xml version="1.0" encoding="utf-8"?>
+<p:sld xmlns:a="http://schemas.openxmlformats.org/drawingml/2006/main" xmlns:r="http://schemas.openxmlformats.org/officeDocument/2006/relationships" xmlns:p="http://schemas.openxmlformats.org/presentationml/2006/main">
+  <p:cSld>
+    <p:spTree>
+      <p:nvGrpSpPr>
+        <p:cNvPr id="1" name=""/>
+        <p:cNvGrpSpPr/>
+        <p:nvPr/>
+      </p:nvGrpSpPr>
+      <p:grpSpPr>
+        <a:xfrm>
+          <a:off x="0" y="0"/>
+          <a:ext cx="0" cy="0"/>
+          <a:chOff x="0" y="0"/>
+          <a:chExt cx="0" cy="0"/>
+        </a:xfrm>
+      </p:grpSpPr>
+      <p:sp>
+        <p:nvSpPr>
+          <p:cNvPr id="347138" name="Rectangle 2"/>
+          <p:cNvSpPr>
+            <a:spLocks noGrp="1" noChangeArrowheads="1"/>
+          </p:cNvSpPr>
+          <p:nvPr>
+            <p:ph type="title"/>
+          </p:nvPr>
+        </p:nvSpPr>
+        <p:spPr/>
+        <p:txBody>
+          <a:bodyPr/>
+          <a:lstStyle/>
+          <a:p>
+            <a:r>
+              <a:rPr lang="fi-FI"/>
+              <a:t>Results</a:t>
+            </a:r>
+          </a:p>
+        </p:txBody>
+      </p:sp>
+      <p:sp>
+        <p:nvSpPr>
+          <p:cNvPr id="347139" name="Rectangle 3"/>
+          <p:cNvSpPr>
+            <a:spLocks noGrp="1" noChangeArrowheads="1"/>
+          </p:cNvSpPr>
+          <p:nvPr>
+            <p:ph type="body" idx="1"/>
+          </p:nvPr>
+        </p:nvSpPr>
+        <p:spPr/>
+        <p:txBody>
+          <a:bodyPr/>
+          <a:lstStyle/>
+          <a:p>
+            <a:r>
+              <a:rPr lang="fi-FI" dirty="0" err="1" smtClean="0"/>
+              <a:t>Playable</a:t>
+            </a:r>
+            <a:r>
+              <a:rPr lang="fi-FI" dirty="0" smtClean="0"/>
+              <a:t> </a:t>
+            </a:r>
+            <a:r>
+              <a:rPr lang="fi-FI" dirty="0" err="1" smtClean="0"/>
+              <a:t>cloud</a:t>
+            </a:r>
+            <a:r>
+              <a:rPr lang="fi-FI" dirty="0" smtClean="0"/>
+              <a:t> </a:t>
+            </a:r>
+            <a:r>
+              <a:rPr lang="fi-FI" dirty="0" err="1" smtClean="0"/>
+              <a:t>game</a:t>
+            </a:r>
+            <a:r>
+              <a:rPr lang="fi-FI" dirty="0" smtClean="0"/>
+              <a:t> </a:t>
+            </a:r>
+            <a:r>
+              <a:rPr lang="fi-FI" dirty="0" err="1" smtClean="0"/>
+              <a:t>with</a:t>
+            </a:r>
+            <a:r>
+              <a:rPr lang="fi-FI" dirty="0" smtClean="0"/>
+              <a:t> </a:t>
+            </a:r>
+            <a:r>
+              <a:rPr lang="fi-FI" dirty="0" err="1" smtClean="0"/>
+              <a:t>performance</a:t>
+            </a:r>
+            <a:r>
+              <a:rPr lang="fi-FI" dirty="0" smtClean="0"/>
+              <a:t> </a:t>
+            </a:r>
+            <a:r>
+              <a:rPr lang="fi-FI" dirty="0" err="1" smtClean="0"/>
+              <a:t>platform</a:t>
+            </a:r>
+            <a:endParaRPr lang="fi-FI" dirty="0" smtClean="0"/>
+          </a:p>
+          <a:p>
+            <a:endParaRPr lang="fi-FI" dirty="0" smtClean="0"/>
+          </a:p>
+          <a:p>
+            <a:r>
+              <a:rPr lang="fi-FI" dirty="0" err="1" smtClean="0"/>
+              <a:t>Bad</a:t>
+            </a:r>
+            <a:r>
+              <a:rPr lang="fi-FI" dirty="0" smtClean="0"/>
+              <a:t> video </a:t>
+            </a:r>
+            <a:r>
+              <a:rPr lang="fi-FI" dirty="0" err="1" smtClean="0"/>
+              <a:t>stream</a:t>
+            </a:r>
+            <a:r>
+              <a:rPr lang="fi-FI" dirty="0" smtClean="0"/>
+              <a:t> </a:t>
+            </a:r>
+            <a:r>
+              <a:rPr lang="fi-FI" dirty="0" err="1" smtClean="0"/>
+              <a:t>quality</a:t>
+            </a:r>
+            <a:r>
+              <a:rPr lang="fi-FI" dirty="0" smtClean="0"/>
+              <a:t> </a:t>
+            </a:r>
+            <a:r>
+              <a:rPr lang="fi-FI" dirty="0" err="1" smtClean="0"/>
+              <a:t>with</a:t>
+            </a:r>
+            <a:r>
+              <a:rPr lang="fi-FI" dirty="0" smtClean="0"/>
+              <a:t> </a:t>
+            </a:r>
+            <a:r>
+              <a:rPr lang="fi-FI" dirty="0" err="1" smtClean="0"/>
+              <a:t>low</a:t>
+            </a:r>
+            <a:r>
+              <a:rPr lang="fi-FI" dirty="0" smtClean="0"/>
+              <a:t> </a:t>
+            </a:r>
+            <a:r>
+              <a:rPr lang="fi-FI" dirty="0" err="1" smtClean="0"/>
+              <a:t>bandwidth</a:t>
+            </a:r>
+            <a:r>
+              <a:rPr lang="fi-FI" dirty="0" smtClean="0"/>
+              <a:t> </a:t>
+            </a:r>
+            <a:r>
+              <a:rPr lang="fi-FI" dirty="0" err="1" smtClean="0"/>
+              <a:t>connection</a:t>
+            </a:r>
+            <a:endParaRPr lang="fi-FI" dirty="0" smtClean="0"/>
+          </a:p>
+          <a:p>
+            <a:endParaRPr lang="fi-FI" dirty="0" smtClean="0"/>
+          </a:p>
+          <a:p>
+            <a:r>
+              <a:rPr lang="fi-FI" dirty="0" err="1" smtClean="0"/>
+              <a:t>User</a:t>
+            </a:r>
+            <a:r>
+              <a:rPr lang="fi-FI" dirty="0" smtClean="0"/>
+              <a:t> </a:t>
+            </a:r>
+            <a:r>
+              <a:rPr lang="fi-FI" dirty="0" err="1" smtClean="0"/>
+              <a:t>control</a:t>
+            </a:r>
+            <a:r>
+              <a:rPr lang="fi-FI" dirty="0" smtClean="0"/>
+              <a:t> </a:t>
+            </a:r>
+            <a:r>
+              <a:rPr lang="fi-FI" dirty="0" err="1" smtClean="0"/>
+              <a:t>transmit</a:t>
+            </a:r>
+            <a:r>
+              <a:rPr lang="fi-FI" dirty="0" smtClean="0"/>
+              <a:t> </a:t>
+            </a:r>
+            <a:r>
+              <a:rPr lang="fi-FI" dirty="0" err="1" smtClean="0"/>
+              <a:t>works</a:t>
+            </a:r>
+            <a:r>
+              <a:rPr lang="fi-FI" dirty="0" smtClean="0"/>
+              <a:t> </a:t>
+            </a:r>
+            <a:r>
+              <a:rPr lang="fi-FI" dirty="0" err="1" smtClean="0"/>
+              <a:t>perfect</a:t>
+            </a:r>
+            <a:endParaRPr lang="fi-FI" dirty="0" smtClean="0"/>
+          </a:p>
+        </p:txBody>
+      </p:sp>
+    </p:spTree>
+  </p:cSld>
+  <p:clrMapOvr>
+    <a:masterClrMapping/>
+  </p:clrMapOvr>
+  <p:timing>
+    <p:tnLst>
+      <p:par>
+        <p:cTn id="1" dur="indefinite" restart="never" nodeType="tmRoot"/>
+      </p:par>
+    </p:tnLst>
+  </p:timing>
+</p:sld>
+</file>
+
+<file path=ppt/slides/slide8.xml><?xml version="1.0" encoding="utf-8"?>
+<p:sld xmlns:a="http://schemas.openxmlformats.org/drawingml/2006/main" xmlns:r="http://schemas.openxmlformats.org/officeDocument/2006/relationships" xmlns:p="http://schemas.openxmlformats.org/presentationml/2006/main">
+  <p:cSld>
+    <p:spTree>
+      <p:nvGrpSpPr>
+        <p:cNvPr id="1" name=""/>
+        <p:cNvGrpSpPr/>
+        <p:nvPr/>
+      </p:nvGrpSpPr>
+      <p:grpSpPr>
+        <a:xfrm>
+          <a:off x="0" y="0"/>
+          <a:ext cx="0" cy="0"/>
+          <a:chOff x="0" y="0"/>
+          <a:chExt cx="0" cy="0"/>
+        </a:xfrm>
+      </p:grpSpPr>
+      <p:sp>
+        <p:nvSpPr>
+          <p:cNvPr id="349186" name="Rectangle 2"/>
+          <p:cNvSpPr>
+            <a:spLocks noGrp="1" noChangeArrowheads="1"/>
+          </p:cNvSpPr>
+          <p:nvPr>
+            <p:ph type="title"/>
+          </p:nvPr>
+        </p:nvSpPr>
+        <p:spPr/>
+        <p:txBody>
+          <a:bodyPr/>
+          <a:lstStyle/>
+          <a:p>
+            <a:r>
+              <a:rPr lang="fi-FI" dirty="0" err="1" smtClean="0"/>
+              <a:t>Game</a:t>
+            </a:r>
+            <a:r>
+              <a:rPr lang="fi-FI" dirty="0" smtClean="0"/>
+              <a:t> </a:t>
+            </a:r>
+            <a:r>
+              <a:rPr lang="fi-FI" dirty="0" err="1" smtClean="0"/>
+              <a:t>stream</a:t>
+            </a:r>
+            <a:r>
+              <a:rPr lang="fi-FI" dirty="0" smtClean="0"/>
+              <a:t> </a:t>
+            </a:r>
+            <a:r>
+              <a:rPr lang="fi-FI" dirty="0" err="1" smtClean="0"/>
+              <a:t>screenshot</a:t>
+            </a:r>
+            <a:endParaRPr lang="fi-FI" dirty="0"/>
+          </a:p>
+        </p:txBody>
+      </p:sp>
+      <p:pic>
+        <p:nvPicPr>
+          <p:cNvPr id="3074" name="Picture 2" descr="D:\Opiskelu\Multimediajärjestelmät\GIT\docs\game.jpg"/>
+          <p:cNvPicPr>
+            <a:picLocks noChangeAspect="1" noChangeArrowheads="1"/>
+          </p:cNvPicPr>
+          <p:nvPr/>
+        </p:nvPicPr>
+        <p:blipFill>
+          <a:blip r:embed="rId3" cstate="print"/>
+          <a:srcRect/>
+          <a:stretch>
+            <a:fillRect/>
+          </a:stretch>
+        </p:blipFill>
+        <p:spPr bwMode="auto">
+          <a:xfrm>
+            <a:off x="923926" y="1143000"/>
+            <a:ext cx="7129166" cy="5305426"/>
+          </a:xfrm>
+          <a:prstGeom prst="rect">
+            <a:avLst/>
+          </a:prstGeom>
+          <a:noFill/>
+        </p:spPr>
+      </p:pic>
+    </p:spTree>
+  </p:cSld>
+  <p:clrMapOvr>
+    <a:masterClrMapping/>
+  </p:clrMapOvr>
+  <p:timing>
+    <p:tnLst>
+      <p:par>
+        <p:cTn id="1" dur="indefinite" restart="never" nodeType="tmRoot"/>
+      </p:par>
+    </p:tnLst>
+  </p:timing>
+</p:sld>
+</file>
+
+<file path=ppt/slides/slide9.xml><?xml version="1.0" encoding="utf-8"?>
+<p:sld xmlns:a="http://schemas.openxmlformats.org/drawingml/2006/main" xmlns:r="http://schemas.openxmlformats.org/officeDocument/2006/relationships" xmlns:p="http://schemas.openxmlformats.org/presentationml/2006/main">
+  <p:cSld>
+    <p:spTree>
+      <p:nvGrpSpPr>
+        <p:cNvPr id="1" name=""/>
+        <p:cNvGrpSpPr/>
+        <p:nvPr/>
+      </p:nvGrpSpPr>
+      <p:grpSpPr>
+        <a:xfrm>
+          <a:off x="0" y="0"/>
+          <a:ext cx="0" cy="0"/>
+          <a:chOff x="0" y="0"/>
+          <a:chExt cx="0" cy="0"/>
+        </a:xfrm>
+      </p:grpSpPr>
+      <p:sp>
+        <p:nvSpPr>
+          <p:cNvPr id="349186" name="Rectangle 2"/>
+          <p:cNvSpPr>
+            <a:spLocks noGrp="1" noChangeArrowheads="1"/>
+          </p:cNvSpPr>
+          <p:nvPr>
+            <p:ph type="title"/>
+          </p:nvPr>
+        </p:nvSpPr>
+        <p:spPr/>
+        <p:txBody>
+          <a:bodyPr/>
+          <a:lstStyle/>
+          <a:p>
+            <a:r>
+              <a:rPr lang="fi-FI" dirty="0" err="1" smtClean="0"/>
+              <a:t>Game</a:t>
+            </a:r>
+            <a:r>
+              <a:rPr lang="fi-FI" dirty="0" smtClean="0"/>
+              <a:t> </a:t>
+            </a:r>
+            <a:r>
+              <a:rPr lang="fi-FI" dirty="0" err="1" smtClean="0"/>
+              <a:t>screenshot</a:t>
+            </a:r>
+            <a:endParaRPr lang="fi-FI" dirty="0"/>
+          </a:p>
+        </p:txBody>
+      </p:sp>
+      <p:pic>
+        <p:nvPicPr>
+          <p:cNvPr id="5122" name="Picture 2"/>
+          <p:cNvPicPr>
+            <a:picLocks noChangeAspect="1" noChangeArrowheads="1"/>
+          </p:cNvPicPr>
+          <p:nvPr/>
+        </p:nvPicPr>
+        <p:blipFill>
+          <a:blip r:embed="rId3" cstate="print"/>
+          <a:srcRect/>
+          <a:stretch>
+            <a:fillRect/>
+          </a:stretch>
+        </p:blipFill>
+        <p:spPr bwMode="auto">
+          <a:xfrm>
+            <a:off x="987424" y="1123950"/>
+            <a:ext cx="7108897" cy="5331673"/>
+          </a:xfrm>
+          <a:prstGeom prst="rect">
+            <a:avLst/>
+          </a:prstGeom>
+          <a:noFill/>
+          <a:ln w="9525">
+            <a:noFill/>
+            <a:miter lim="800000"/>
+            <a:headEnd/>
+            <a:tailEnd/>
+          </a:ln>
+        </p:spPr>
+      </p:pic>
+    </p:spTree>
+  </p:cSld>
+  <p:clrMapOvr>
+    <a:masterClrMapping/>
+  </p:clrMapOvr>
+  <p:timing>
+    <p:tnLst>
+      <p:par>
+        <p:cTn id="1" dur="indefinite" restart="never" nodeType="tmRoot"/>
+      </p:par>
+    </p:tnLst>
+  </p:timing>
 </p:sld>
 </file>
 

</xml_diff>